<commit_message>
Chỉnh lại đoạn nói về insertion
</commit_message>
<xml_diff>
--- a/Seminar.pptx
+++ b/Seminar.pptx
@@ -15987,7 +15987,62 @@
                 <a:latin typeface="Times New Roman" panose="02020603050405020304" pitchFamily="18" charset="0"/>
                 <a:ea typeface="Times New Roman" panose="02020603050405020304" pitchFamily="18" charset="0"/>
               </a:rPr>
-              <a:t>In this function</a:t>
+              <a:t>In this function, a node named </a:t>
+            </a:r>
+            <a:r>
+              <a:rPr lang="en-US" sz="1800" b="1" i="1" dirty="0">
+                <a:solidFill>
+                  <a:srgbClr val="212529"/>
+                </a:solidFill>
+                <a:effectLst/>
+                <a:latin typeface="Times New Roman" panose="02020603050405020304" pitchFamily="18" charset="0"/>
+                <a:ea typeface="Times New Roman" panose="02020603050405020304" pitchFamily="18" charset="0"/>
+              </a:rPr>
+              <a:t>y</a:t>
+            </a:r>
+            <a:r>
+              <a:rPr lang="en-US" sz="1800" dirty="0">
+                <a:solidFill>
+                  <a:srgbClr val="212529"/>
+                </a:solidFill>
+                <a:effectLst/>
+                <a:latin typeface="Times New Roman" panose="02020603050405020304" pitchFamily="18" charset="0"/>
+                <a:ea typeface="Times New Roman" panose="02020603050405020304" pitchFamily="18" charset="0"/>
+              </a:rPr>
+              <a:t> will be split into 2 children, the first child have the keys from the first key to </a:t>
+            </a:r>
+            <a:r>
+              <a:rPr lang="en-US" sz="1800" dirty="0" err="1">
+                <a:solidFill>
+                  <a:srgbClr val="212529"/>
+                </a:solidFill>
+                <a:effectLst/>
+                <a:latin typeface="Times New Roman" panose="02020603050405020304" pitchFamily="18" charset="0"/>
+                <a:ea typeface="Times New Roman" panose="02020603050405020304" pitchFamily="18" charset="0"/>
+              </a:rPr>
+              <a:t>i</a:t>
+            </a:r>
+            <a:r>
+              <a:rPr lang="en-US" sz="1800" baseline="30000" dirty="0" err="1">
+                <a:solidFill>
+                  <a:srgbClr val="212529"/>
+                </a:solidFill>
+                <a:effectLst/>
+                <a:latin typeface="Times New Roman" panose="02020603050405020304" pitchFamily="18" charset="0"/>
+                <a:ea typeface="Times New Roman" panose="02020603050405020304" pitchFamily="18" charset="0"/>
+              </a:rPr>
+              <a:t>th</a:t>
+            </a:r>
+            <a:r>
+              <a:rPr lang="en-US" sz="1800" dirty="0">
+                <a:solidFill>
+                  <a:srgbClr val="212529"/>
+                </a:solidFill>
+                <a:effectLst/>
+                <a:latin typeface="Times New Roman" panose="02020603050405020304" pitchFamily="18" charset="0"/>
+                <a:ea typeface="Times New Roman" panose="02020603050405020304" pitchFamily="18" charset="0"/>
+              </a:rPr>
+              <a:t> key of </a:t>
             </a:r>
             <a:r>
               <a:rPr lang="en-US" sz="1800">
@@ -15998,7 +16053,7 @@
                 <a:latin typeface="Times New Roman" panose="02020603050405020304" pitchFamily="18" charset="0"/>
                 <a:ea typeface="Times New Roman" panose="02020603050405020304" pitchFamily="18" charset="0"/>
               </a:rPr>
-              <a:t>, a </a:t>
+              <a:t>the previous node, </a:t>
             </a:r>
             <a:r>
               <a:rPr lang="en-US" sz="1800" dirty="0">
@@ -16009,62 +16064,7 @@
                 <a:latin typeface="Times New Roman" panose="02020603050405020304" pitchFamily="18" charset="0"/>
                 <a:ea typeface="Times New Roman" panose="02020603050405020304" pitchFamily="18" charset="0"/>
               </a:rPr>
-              <a:t>node named </a:t>
-            </a:r>
-            <a:r>
-              <a:rPr lang="en-US" sz="1800" b="1" i="1" dirty="0">
-                <a:solidFill>
-                  <a:srgbClr val="212529"/>
-                </a:solidFill>
-                <a:effectLst/>
-                <a:latin typeface="Times New Roman" panose="02020603050405020304" pitchFamily="18" charset="0"/>
-                <a:ea typeface="Times New Roman" panose="02020603050405020304" pitchFamily="18" charset="0"/>
-              </a:rPr>
-              <a:t>y</a:t>
-            </a:r>
-            <a:r>
-              <a:rPr lang="en-US" sz="1800" dirty="0">
-                <a:solidFill>
-                  <a:srgbClr val="212529"/>
-                </a:solidFill>
-                <a:effectLst/>
-                <a:latin typeface="Times New Roman" panose="02020603050405020304" pitchFamily="18" charset="0"/>
-                <a:ea typeface="Times New Roman" panose="02020603050405020304" pitchFamily="18" charset="0"/>
-              </a:rPr>
-              <a:t> will be split out to 2 children, the first child have the keys from the first key to </a:t>
-            </a:r>
-            <a:r>
-              <a:rPr lang="en-US" sz="1800" dirty="0" err="1">
-                <a:solidFill>
-                  <a:srgbClr val="212529"/>
-                </a:solidFill>
-                <a:effectLst/>
-                <a:latin typeface="Times New Roman" panose="02020603050405020304" pitchFamily="18" charset="0"/>
-                <a:ea typeface="Times New Roman" panose="02020603050405020304" pitchFamily="18" charset="0"/>
-              </a:rPr>
-              <a:t>i</a:t>
-            </a:r>
-            <a:r>
-              <a:rPr lang="en-US" sz="1800" baseline="30000" dirty="0" err="1">
-                <a:solidFill>
-                  <a:srgbClr val="212529"/>
-                </a:solidFill>
-                <a:effectLst/>
-                <a:latin typeface="Times New Roman" panose="02020603050405020304" pitchFamily="18" charset="0"/>
-                <a:ea typeface="Times New Roman" panose="02020603050405020304" pitchFamily="18" charset="0"/>
-              </a:rPr>
-              <a:t>th</a:t>
-            </a:r>
-            <a:r>
-              <a:rPr lang="en-US" sz="1800" dirty="0">
-                <a:solidFill>
-                  <a:srgbClr val="212529"/>
-                </a:solidFill>
-                <a:effectLst/>
-                <a:latin typeface="Times New Roman" panose="02020603050405020304" pitchFamily="18" charset="0"/>
-                <a:ea typeface="Times New Roman" panose="02020603050405020304" pitchFamily="18" charset="0"/>
-              </a:rPr>
-              <a:t> key of the previous child, and the remaining child will have the other keys, and them both connect to the parent of node </a:t>
+              <a:t>and the remaining child will have the other keys, and them both connect to the parent of node </a:t>
             </a:r>
             <a:r>
               <a:rPr lang="en-US" sz="1800" b="1" i="1" dirty="0">

</xml_diff>

<commit_message>
Update phan split children
</commit_message>
<xml_diff>
--- a/Seminar.pptx
+++ b/Seminar.pptx
@@ -593,10 +593,7 @@
           <a:bodyPr/>
           <a:lstStyle/>
           <a:p>
-            <a:r>
-              <a:rPr lang="en-VN" dirty="0"/>
-              <a:t>Ở giai đoạn tách con này, con của một node cha tên y </a:t>
-            </a:r>
+            <a:endParaRPr lang="en-VN" dirty="0"/>
           </a:p>
         </p:txBody>
       </p:sp>
@@ -15952,7 +15949,7 @@
         <p:spPr>
           <a:xfrm>
             <a:off x="1453243" y="1166171"/>
-            <a:ext cx="3361825" cy="2933432"/>
+            <a:ext cx="3361825" cy="1977786"/>
           </a:xfrm>
           <a:prstGeom prst="rect">
             <a:avLst/>
@@ -15987,108 +15984,59 @@
                 <a:latin typeface="Times New Roman" panose="02020603050405020304" pitchFamily="18" charset="0"/>
                 <a:ea typeface="Times New Roman" panose="02020603050405020304" pitchFamily="18" charset="0"/>
               </a:rPr>
-              <a:t>In this function</a:t>
-            </a:r>
-            <a:r>
-              <a:rPr lang="en-US" sz="1800">
+              <a:t>In this function, before inserting a value, we </a:t>
+            </a:r>
+            <a:r>
+              <a:rPr lang="en-US" dirty="0">
                 <a:solidFill>
                   <a:srgbClr val="212529"/>
                 </a:solidFill>
-                <a:effectLst/>
                 <a:latin typeface="Times New Roman" panose="02020603050405020304" pitchFamily="18" charset="0"/>
                 <a:ea typeface="Times New Roman" panose="02020603050405020304" pitchFamily="18" charset="0"/>
               </a:rPr>
-              <a:t>, a </a:t>
-            </a:r>
-            <a:r>
-              <a:rPr lang="en-US" sz="1800" dirty="0">
+              <a:t>know that a child node named y is already full, therefore we have to split it. We also have </a:t>
+            </a:r>
+            <a:r>
+              <a:rPr lang="en-US" b="1" i="1" dirty="0" err="1">
                 <a:solidFill>
                   <a:srgbClr val="212529"/>
                 </a:solidFill>
-                <a:effectLst/>
                 <a:latin typeface="Times New Roman" panose="02020603050405020304" pitchFamily="18" charset="0"/>
                 <a:ea typeface="Times New Roman" panose="02020603050405020304" pitchFamily="18" charset="0"/>
               </a:rPr>
-              <a:t>node named </a:t>
-            </a:r>
-            <a:r>
-              <a:rPr lang="en-US" sz="1800" b="1" i="1" dirty="0">
+              <a:t>i</a:t>
+            </a:r>
+            <a:r>
+              <a:rPr lang="en-US" b="1" i="1" dirty="0">
                 <a:solidFill>
                   <a:srgbClr val="212529"/>
                 </a:solidFill>
-                <a:effectLst/>
                 <a:latin typeface="Times New Roman" panose="02020603050405020304" pitchFamily="18" charset="0"/>
                 <a:ea typeface="Times New Roman" panose="02020603050405020304" pitchFamily="18" charset="0"/>
               </a:rPr>
-              <a:t>y</a:t>
-            </a:r>
-            <a:r>
-              <a:rPr lang="en-US" sz="1800" dirty="0">
+              <a:t> </a:t>
+            </a:r>
+            <a:r>
+              <a:rPr lang="en-US" dirty="0">
                 <a:solidFill>
                   <a:srgbClr val="212529"/>
                 </a:solidFill>
-                <a:effectLst/>
                 <a:latin typeface="Times New Roman" panose="02020603050405020304" pitchFamily="18" charset="0"/>
                 <a:ea typeface="Times New Roman" panose="02020603050405020304" pitchFamily="18" charset="0"/>
               </a:rPr>
-              <a:t> will be split out to 2 children, the first child have the keys from the first key to </a:t>
-            </a:r>
-            <a:r>
-              <a:rPr lang="en-US" sz="1800" dirty="0" err="1">
+              <a:t>as the index of children array. </a:t>
+            </a:r>
+            <a:r>
+              <a:rPr lang="en-US" b="1" i="1" dirty="0">
                 <a:solidFill>
                   <a:srgbClr val="212529"/>
                 </a:solidFill>
-                <a:effectLst/>
                 <a:latin typeface="Times New Roman" panose="02020603050405020304" pitchFamily="18" charset="0"/>
                 <a:ea typeface="Times New Roman" panose="02020603050405020304" pitchFamily="18" charset="0"/>
               </a:rPr>
-              <a:t>i</a:t>
-            </a:r>
-            <a:r>
-              <a:rPr lang="en-US" sz="1800" baseline="30000" dirty="0" err="1">
-                <a:solidFill>
-                  <a:srgbClr val="212529"/>
-                </a:solidFill>
-                <a:effectLst/>
-                <a:latin typeface="Times New Roman" panose="02020603050405020304" pitchFamily="18" charset="0"/>
-                <a:ea typeface="Times New Roman" panose="02020603050405020304" pitchFamily="18" charset="0"/>
-              </a:rPr>
-              <a:t>th</a:t>
-            </a:r>
-            <a:r>
-              <a:rPr lang="en-US" sz="1800" dirty="0">
-                <a:solidFill>
-                  <a:srgbClr val="212529"/>
-                </a:solidFill>
-                <a:effectLst/>
-                <a:latin typeface="Times New Roman" panose="02020603050405020304" pitchFamily="18" charset="0"/>
-                <a:ea typeface="Times New Roman" panose="02020603050405020304" pitchFamily="18" charset="0"/>
-              </a:rPr>
-              <a:t> key of the previous child, and the remaining child will have the other keys, and them both connect to the parent of node </a:t>
-            </a:r>
-            <a:r>
-              <a:rPr lang="en-US" sz="1800" b="1" i="1" dirty="0">
-                <a:solidFill>
-                  <a:srgbClr val="212529"/>
-                </a:solidFill>
-                <a:effectLst/>
-                <a:latin typeface="Times New Roman" panose="02020603050405020304" pitchFamily="18" charset="0"/>
-                <a:ea typeface="Times New Roman" panose="02020603050405020304" pitchFamily="18" charset="0"/>
-              </a:rPr>
-              <a:t>y</a:t>
-            </a:r>
-            <a:r>
-              <a:rPr lang="en-US" sz="1800" dirty="0">
-                <a:solidFill>
-                  <a:srgbClr val="212529"/>
-                </a:solidFill>
-                <a:effectLst/>
-                <a:latin typeface="Times New Roman" panose="02020603050405020304" pitchFamily="18" charset="0"/>
-                <a:ea typeface="Times New Roman" panose="02020603050405020304" pitchFamily="18" charset="0"/>
-              </a:rPr>
-              <a:t> in the function .</a:t>
-            </a:r>
-            <a:endParaRPr lang="en-US" sz="1400" dirty="0">
+              <a:t> </a:t>
+            </a:r>
+            <a:endParaRPr lang="en-US" sz="1400" b="1" i="1" dirty="0">
               <a:effectLst/>
               <a:latin typeface="Arial" panose="020B0604020202020204" pitchFamily="34" charset="0"/>
               <a:ea typeface="Arial" panose="020B0604020202020204" pitchFamily="34" charset="0"/>

</xml_diff>

<commit_message>
Chỉnh đúng nội dung ppt
</commit_message>
<xml_diff>
--- a/Seminar.pptx
+++ b/Seminar.pptx
@@ -282,7 +282,7 @@
           <a:p>
             <a:fld id="{C8D18E60-4300-4729-A0D7-6AB984C3922D}" type="datetimeFigureOut">
               <a:rPr lang="en-US" smtClean="0"/>
-              <a:t>7/16/22</a:t>
+              <a:t>7/18/22</a:t>
             </a:fld>
             <a:endParaRPr lang="en-US"/>
           </a:p>
@@ -1100,7 +1100,7 @@
             <a:fld id="{53074F12-AA26-4AC8-9962-C36BB8F32554}" type="datetimeFigureOut">
               <a:rPr lang="en-US" smtClean="0"/>
               <a:pPr/>
-              <a:t>7/16/22</a:t>
+              <a:t>7/18/22</a:t>
             </a:fld>
             <a:endParaRPr lang="en-US"/>
           </a:p>
@@ -1354,7 +1354,7 @@
             <a:fld id="{53074F12-AA26-4AC8-9962-C36BB8F32554}" type="datetimeFigureOut">
               <a:rPr lang="en-US" smtClean="0"/>
               <a:pPr/>
-              <a:t>7/16/22</a:t>
+              <a:t>7/18/22</a:t>
             </a:fld>
             <a:endParaRPr lang="en-US"/>
           </a:p>
@@ -1524,7 +1524,7 @@
             <a:fld id="{53074F12-AA26-4AC8-9962-C36BB8F32554}" type="datetimeFigureOut">
               <a:rPr lang="en-US" smtClean="0"/>
               <a:pPr/>
-              <a:t>7/16/22</a:t>
+              <a:t>7/18/22</a:t>
             </a:fld>
             <a:endParaRPr lang="en-US"/>
           </a:p>
@@ -1704,7 +1704,7 @@
             <a:fld id="{53074F12-AA26-4AC8-9962-C36BB8F32554}" type="datetimeFigureOut">
               <a:rPr lang="en-US" smtClean="0"/>
               <a:pPr/>
-              <a:t>7/16/22</a:t>
+              <a:t>7/18/22</a:t>
             </a:fld>
             <a:endParaRPr lang="en-US"/>
           </a:p>
@@ -1989,7 +1989,7 @@
             <a:fld id="{53074F12-AA26-4AC8-9962-C36BB8F32554}" type="datetimeFigureOut">
               <a:rPr lang="en-US" smtClean="0"/>
               <a:pPr/>
-              <a:t>7/16/22</a:t>
+              <a:t>7/18/22</a:t>
             </a:fld>
             <a:endParaRPr lang="en-US"/>
           </a:p>
@@ -2236,7 +2236,7 @@
             <a:fld id="{53074F12-AA26-4AC8-9962-C36BB8F32554}" type="datetimeFigureOut">
               <a:rPr lang="en-US" smtClean="0"/>
               <a:pPr/>
-              <a:t>7/16/22</a:t>
+              <a:t>7/18/22</a:t>
             </a:fld>
             <a:endParaRPr lang="en-US"/>
           </a:p>
@@ -2483,7 +2483,7 @@
             <a:fld id="{53074F12-AA26-4AC8-9962-C36BB8F32554}" type="datetimeFigureOut">
               <a:rPr lang="en-US" smtClean="0"/>
               <a:pPr/>
-              <a:t>7/16/22</a:t>
+              <a:t>7/18/22</a:t>
             </a:fld>
             <a:endParaRPr lang="en-US"/>
           </a:p>
@@ -2770,7 +2770,7 @@
             <a:fld id="{53074F12-AA26-4AC8-9962-C36BB8F32554}" type="datetimeFigureOut">
               <a:rPr lang="en-US" smtClean="0"/>
               <a:pPr/>
-              <a:t>7/16/22</a:t>
+              <a:t>7/18/22</a:t>
             </a:fld>
             <a:endParaRPr lang="en-US"/>
           </a:p>
@@ -3260,7 +3260,7 @@
             <a:fld id="{53074F12-AA26-4AC8-9962-C36BB8F32554}" type="datetimeFigureOut">
               <a:rPr lang="en-US" smtClean="0"/>
               <a:pPr/>
-              <a:t>7/16/22</a:t>
+              <a:t>7/18/22</a:t>
             </a:fld>
             <a:endParaRPr lang="en-US"/>
           </a:p>
@@ -3379,7 +3379,7 @@
             <a:fld id="{53074F12-AA26-4AC8-9962-C36BB8F32554}" type="datetimeFigureOut">
               <a:rPr lang="en-US" smtClean="0"/>
               <a:pPr/>
-              <a:t>7/16/22</a:t>
+              <a:t>7/18/22</a:t>
             </a:fld>
             <a:endParaRPr lang="en-US"/>
           </a:p>
@@ -3476,7 +3476,7 @@
             <a:fld id="{53074F12-AA26-4AC8-9962-C36BB8F32554}" type="datetimeFigureOut">
               <a:rPr lang="en-US" smtClean="0"/>
               <a:pPr/>
-              <a:t>7/16/22</a:t>
+              <a:t>7/18/22</a:t>
             </a:fld>
             <a:endParaRPr lang="en-US"/>
           </a:p>
@@ -3753,7 +3753,7 @@
             <a:fld id="{53074F12-AA26-4AC8-9962-C36BB8F32554}" type="datetimeFigureOut">
               <a:rPr lang="en-US" smtClean="0"/>
               <a:pPr/>
-              <a:t>7/16/22</a:t>
+              <a:t>7/18/22</a:t>
             </a:fld>
             <a:endParaRPr lang="en-US"/>
           </a:p>
@@ -3975,7 +3975,7 @@
             <a:fld id="{53074F12-AA26-4AC8-9962-C36BB8F32554}" type="datetimeFigureOut">
               <a:rPr lang="en-US" smtClean="0"/>
               <a:pPr/>
-              <a:t>7/16/22</a:t>
+              <a:t>7/18/22</a:t>
             </a:fld>
             <a:endParaRPr lang="en-US"/>
           </a:p>
@@ -15984,7 +15984,7 @@
                 <a:latin typeface="Times New Roman" panose="02020603050405020304" pitchFamily="18" charset="0"/>
                 <a:ea typeface="Times New Roman" panose="02020603050405020304" pitchFamily="18" charset="0"/>
               </a:rPr>
-              <a:t>In this function, before inserting a value, we </a:t>
+              <a:t>In this function, before inserting a value, should we </a:t>
             </a:r>
             <a:r>
               <a:rPr lang="en-US" dirty="0">
@@ -15994,7 +15994,27 @@
                 <a:latin typeface="Times New Roman" panose="02020603050405020304" pitchFamily="18" charset="0"/>
                 <a:ea typeface="Times New Roman" panose="02020603050405020304" pitchFamily="18" charset="0"/>
               </a:rPr>
-              <a:t>know that a child node named y is already full, therefore we have to split it. We also have </a:t>
+              <a:t>know that a child node named y is already full</a:t>
+            </a:r>
+            <a:r>
+              <a:rPr lang="en-US">
+                <a:solidFill>
+                  <a:srgbClr val="212529"/>
+                </a:solidFill>
+                <a:latin typeface="Times New Roman" panose="02020603050405020304" pitchFamily="18" charset="0"/>
+                <a:ea typeface="Times New Roman" panose="02020603050405020304" pitchFamily="18" charset="0"/>
+              </a:rPr>
+              <a:t>, we </a:t>
+            </a:r>
+            <a:r>
+              <a:rPr lang="en-US" dirty="0">
+                <a:solidFill>
+                  <a:srgbClr val="212529"/>
+                </a:solidFill>
+                <a:latin typeface="Times New Roman" panose="02020603050405020304" pitchFamily="18" charset="0"/>
+                <a:ea typeface="Times New Roman" panose="02020603050405020304" pitchFamily="18" charset="0"/>
+              </a:rPr>
+              <a:t>have to split it. We also have </a:t>
             </a:r>
             <a:r>
               <a:rPr lang="en-US" b="1" i="1" dirty="0" err="1">

</xml_diff>